<commit_message>
Widen main content placeholder
</commit_message>
<xml_diff>
--- a/dewg_template_chords.pptx
+++ b/dewg_template_chords.pptx
@@ -181,8 +181,8 @@
         </p:nvSpPr>
         <p:spPr>
           <a:xfrm>
-            <a:off x="437322" y="923544"/>
-            <a:ext cx="11314706" cy="5733288"/>
+            <a:off x="167054" y="923544"/>
+            <a:ext cx="11887200" cy="5733288"/>
           </a:xfrm>
         </p:spPr>
         <p:txBody>
@@ -407,7 +407,7 @@
           <a:p>
             <a:fld id="{68ECC7E0-1A85-40B3-AD4A-E5AD0E7B5C6B}" type="datetimeFigureOut">
               <a:rPr lang="en-US" smtClean="0"/>
-              <a:t>7/2/2021</a:t>
+              <a:t>4/24/2022</a:t>
             </a:fld>
             <a:endParaRPr lang="en-US"/>
           </a:p>
@@ -648,7 +648,7 @@
           <a:p>
             <a:fld id="{68ECC7E0-1A85-40B3-AD4A-E5AD0E7B5C6B}" type="datetimeFigureOut">
               <a:rPr lang="en-US" smtClean="0"/>
-              <a:t>7/2/2021</a:t>
+              <a:t>4/24/2022</a:t>
             </a:fld>
             <a:endParaRPr lang="en-US"/>
           </a:p>

</xml_diff>